<commit_message>
update .gitignore update blog documents
</commit_message>
<xml_diff>
--- a/documents_for_blog/blog.pptx
+++ b/documents_for_blog/blog.pptx
@@ -13,6 +13,7 @@
     <p:sldId id="261" r:id="rId7"/>
     <p:sldId id="262" r:id="rId8"/>
     <p:sldId id="263" r:id="rId9"/>
+    <p:sldId id="264" r:id="rId10"/>
   </p:sldIdLst>
   <p:sldSz cx="12192000" cy="6858000"/>
   <p:notesSz cx="6858000" cy="9144000"/>
@@ -248,7 +249,7 @@
           <a:p>
             <a:fld id="{76F80488-8C22-4ECD-ADCE-62BD7D3F29B3}" type="datetimeFigureOut">
               <a:rPr kumimoji="1" lang="ja-JP" altLang="en-US" smtClean="0"/>
-              <a:t>2016/6/5</a:t>
+              <a:t>2016/6/6</a:t>
             </a:fld>
             <a:endParaRPr kumimoji="1" lang="ja-JP" altLang="en-US"/>
           </a:p>
@@ -448,7 +449,7 @@
           <a:p>
             <a:fld id="{76F80488-8C22-4ECD-ADCE-62BD7D3F29B3}" type="datetimeFigureOut">
               <a:rPr kumimoji="1" lang="ja-JP" altLang="en-US" smtClean="0"/>
-              <a:t>2016/6/5</a:t>
+              <a:t>2016/6/6</a:t>
             </a:fld>
             <a:endParaRPr kumimoji="1" lang="ja-JP" altLang="en-US"/>
           </a:p>
@@ -658,7 +659,7 @@
           <a:p>
             <a:fld id="{76F80488-8C22-4ECD-ADCE-62BD7D3F29B3}" type="datetimeFigureOut">
               <a:rPr kumimoji="1" lang="ja-JP" altLang="en-US" smtClean="0"/>
-              <a:t>2016/6/5</a:t>
+              <a:t>2016/6/6</a:t>
             </a:fld>
             <a:endParaRPr kumimoji="1" lang="ja-JP" altLang="en-US"/>
           </a:p>
@@ -858,7 +859,7 @@
           <a:p>
             <a:fld id="{76F80488-8C22-4ECD-ADCE-62BD7D3F29B3}" type="datetimeFigureOut">
               <a:rPr kumimoji="1" lang="ja-JP" altLang="en-US" smtClean="0"/>
-              <a:t>2016/6/5</a:t>
+              <a:t>2016/6/6</a:t>
             </a:fld>
             <a:endParaRPr kumimoji="1" lang="ja-JP" altLang="en-US"/>
           </a:p>
@@ -1103,7 +1104,7 @@
           <a:p>
             <a:fld id="{76F80488-8C22-4ECD-ADCE-62BD7D3F29B3}" type="datetimeFigureOut">
               <a:rPr kumimoji="1" lang="ja-JP" altLang="en-US" smtClean="0"/>
-              <a:t>2016/6/5</a:t>
+              <a:t>2016/6/6</a:t>
             </a:fld>
             <a:endParaRPr kumimoji="1" lang="ja-JP" altLang="en-US"/>
           </a:p>
@@ -1396,7 +1397,7 @@
           <a:p>
             <a:fld id="{76F80488-8C22-4ECD-ADCE-62BD7D3F29B3}" type="datetimeFigureOut">
               <a:rPr kumimoji="1" lang="ja-JP" altLang="en-US" smtClean="0"/>
-              <a:t>2016/6/5</a:t>
+              <a:t>2016/6/6</a:t>
             </a:fld>
             <a:endParaRPr kumimoji="1" lang="ja-JP" altLang="en-US"/>
           </a:p>
@@ -1824,7 +1825,7 @@
           <a:p>
             <a:fld id="{76F80488-8C22-4ECD-ADCE-62BD7D3F29B3}" type="datetimeFigureOut">
               <a:rPr kumimoji="1" lang="ja-JP" altLang="en-US" smtClean="0"/>
-              <a:t>2016/6/5</a:t>
+              <a:t>2016/6/6</a:t>
             </a:fld>
             <a:endParaRPr kumimoji="1" lang="ja-JP" altLang="en-US"/>
           </a:p>
@@ -1941,7 +1942,7 @@
           <a:p>
             <a:fld id="{76F80488-8C22-4ECD-ADCE-62BD7D3F29B3}" type="datetimeFigureOut">
               <a:rPr kumimoji="1" lang="ja-JP" altLang="en-US" smtClean="0"/>
-              <a:t>2016/6/5</a:t>
+              <a:t>2016/6/6</a:t>
             </a:fld>
             <a:endParaRPr kumimoji="1" lang="ja-JP" altLang="en-US"/>
           </a:p>
@@ -2036,7 +2037,7 @@
           <a:p>
             <a:fld id="{76F80488-8C22-4ECD-ADCE-62BD7D3F29B3}" type="datetimeFigureOut">
               <a:rPr kumimoji="1" lang="ja-JP" altLang="en-US" smtClean="0"/>
-              <a:t>2016/6/5</a:t>
+              <a:t>2016/6/6</a:t>
             </a:fld>
             <a:endParaRPr kumimoji="1" lang="ja-JP" altLang="en-US"/>
           </a:p>
@@ -2343,7 +2344,7 @@
           <a:p>
             <a:fld id="{76F80488-8C22-4ECD-ADCE-62BD7D3F29B3}" type="datetimeFigureOut">
               <a:rPr kumimoji="1" lang="ja-JP" altLang="en-US" smtClean="0"/>
-              <a:t>2016/6/5</a:t>
+              <a:t>2016/6/6</a:t>
             </a:fld>
             <a:endParaRPr kumimoji="1" lang="ja-JP" altLang="en-US"/>
           </a:p>
@@ -2595,7 +2596,7 @@
           <a:p>
             <a:fld id="{76F80488-8C22-4ECD-ADCE-62BD7D3F29B3}" type="datetimeFigureOut">
               <a:rPr kumimoji="1" lang="ja-JP" altLang="en-US" smtClean="0"/>
-              <a:t>2016/6/5</a:t>
+              <a:t>2016/6/6</a:t>
             </a:fld>
             <a:endParaRPr kumimoji="1" lang="ja-JP" altLang="en-US"/>
           </a:p>
@@ -2838,7 +2839,7 @@
           <a:p>
             <a:fld id="{76F80488-8C22-4ECD-ADCE-62BD7D3F29B3}" type="datetimeFigureOut">
               <a:rPr kumimoji="1" lang="ja-JP" altLang="en-US" smtClean="0"/>
-              <a:t>2016/6/5</a:t>
+              <a:t>2016/6/6</a:t>
             </a:fld>
             <a:endParaRPr kumimoji="1" lang="ja-JP" altLang="en-US"/>
           </a:p>
@@ -19027,13 +19028,6 @@
               </a:rPr>
               <a:t>変化あり</a:t>
             </a:r>
-            <a:endParaRPr kumimoji="1" lang="ja-JP" altLang="en-US">
-              <a:solidFill>
-                <a:srgbClr val="00B0F0"/>
-              </a:solidFill>
-              <a:latin typeface="HGS創英角ｺﾞｼｯｸUB" panose="020B0900000000000000" pitchFamily="50" charset="-128"/>
-              <a:ea typeface="HGS創英角ｺﾞｼｯｸUB" panose="020B0900000000000000" pitchFamily="50" charset="-128"/>
-            </a:endParaRPr>
           </a:p>
         </p:txBody>
       </p:sp>
@@ -19086,13 +19080,6 @@
               </a:rPr>
               <a:t>変化なし</a:t>
             </a:r>
-            <a:endParaRPr kumimoji="1" lang="ja-JP" altLang="en-US">
-              <a:solidFill>
-                <a:schemeClr val="tx1"/>
-              </a:solidFill>
-              <a:latin typeface="HGS創英角ｺﾞｼｯｸUB" panose="020B0900000000000000" pitchFamily="50" charset="-128"/>
-              <a:ea typeface="HGS創英角ｺﾞｼｯｸUB" panose="020B0900000000000000" pitchFamily="50" charset="-128"/>
-            </a:endParaRPr>
           </a:p>
         </p:txBody>
       </p:sp>
@@ -19264,13 +19251,6 @@
               </a:rPr>
               <a:t>変化なし</a:t>
             </a:r>
-            <a:endParaRPr kumimoji="1" lang="ja-JP" altLang="en-US">
-              <a:solidFill>
-                <a:schemeClr val="tx1"/>
-              </a:solidFill>
-              <a:latin typeface="HGS創英角ｺﾞｼｯｸUB" panose="020B0900000000000000" pitchFamily="50" charset="-128"/>
-              <a:ea typeface="HGS創英角ｺﾞｼｯｸUB" panose="020B0900000000000000" pitchFamily="50" charset="-128"/>
-            </a:endParaRPr>
           </a:p>
         </p:txBody>
       </p:sp>
@@ -19323,13 +19303,6 @@
               </a:rPr>
               <a:t>変化あり</a:t>
             </a:r>
-            <a:endParaRPr kumimoji="1" lang="ja-JP" altLang="en-US">
-              <a:solidFill>
-                <a:srgbClr val="FF0000"/>
-              </a:solidFill>
-              <a:latin typeface="HGS創英角ｺﾞｼｯｸUB" panose="020B0900000000000000" pitchFamily="50" charset="-128"/>
-              <a:ea typeface="HGS創英角ｺﾞｼｯｸUB" panose="020B0900000000000000" pitchFamily="50" charset="-128"/>
-            </a:endParaRPr>
           </a:p>
         </p:txBody>
       </p:sp>
@@ -19586,10 +19559,6 @@
               </a:rPr>
               <a:t>わかれば良さげ</a:t>
             </a:r>
-            <a:endParaRPr kumimoji="1" lang="ja-JP" altLang="en-US">
-              <a:latin typeface="HGS創英角ｺﾞｼｯｸUB" panose="020B0900000000000000" pitchFamily="50" charset="-128"/>
-              <a:ea typeface="HGS創英角ｺﾞｼｯｸUB" panose="020B0900000000000000" pitchFamily="50" charset="-128"/>
-            </a:endParaRPr>
           </a:p>
         </p:txBody>
       </p:sp>
@@ -19673,6 +19642,237 @@
     <p:extLst>
       <p:ext uri="{BB962C8B-B14F-4D97-AF65-F5344CB8AC3E}">
         <p14:creationId xmlns:p14="http://schemas.microsoft.com/office/powerpoint/2010/main" val="1902945543"/>
+      </p:ext>
+    </p:extLst>
+  </p:cSld>
+  <p:clrMapOvr>
+    <a:masterClrMapping/>
+  </p:clrMapOvr>
+</p:sld>
+</file>
+
+<file path=ppt/slides/slide9.xml><?xml version="1.0" encoding="utf-8"?>
+<p:sld xmlns:a="http://schemas.openxmlformats.org/drawingml/2006/main" xmlns:r="http://schemas.openxmlformats.org/officeDocument/2006/relationships" xmlns:p="http://schemas.openxmlformats.org/presentationml/2006/main">
+  <p:cSld>
+    <p:spTree>
+      <p:nvGrpSpPr>
+        <p:cNvPr id="1" name=""/>
+        <p:cNvGrpSpPr/>
+        <p:nvPr/>
+      </p:nvGrpSpPr>
+      <p:grpSpPr>
+        <a:xfrm>
+          <a:off x="0" y="0"/>
+          <a:ext cx="0" cy="0"/>
+          <a:chOff x="0" y="0"/>
+          <a:chExt cx="0" cy="0"/>
+        </a:xfrm>
+      </p:grpSpPr>
+      <p:pic>
+        <p:nvPicPr>
+          <p:cNvPr id="2" name="図 1"/>
+          <p:cNvPicPr>
+            <a:picLocks noChangeAspect="1"/>
+          </p:cNvPicPr>
+          <p:nvPr/>
+        </p:nvPicPr>
+        <p:blipFill>
+          <a:blip r:embed="rId2">
+            <a:extLst>
+              <a:ext uri="{28A0092B-C50C-407E-A947-70E740481C1C}">
+                <a14:useLocalDpi xmlns:a14="http://schemas.microsoft.com/office/drawing/2010/main" val="0"/>
+              </a:ext>
+            </a:extLst>
+          </a:blip>
+          <a:stretch>
+            <a:fillRect/>
+          </a:stretch>
+        </p:blipFill>
+        <p:spPr>
+          <a:xfrm>
+            <a:off x="5945199" y="1089622"/>
+            <a:ext cx="3257550" cy="5438775"/>
+          </a:xfrm>
+          <a:prstGeom prst="rect">
+            <a:avLst/>
+          </a:prstGeom>
+        </p:spPr>
+      </p:pic>
+      <p:pic>
+        <p:nvPicPr>
+          <p:cNvPr id="3" name="図 2"/>
+          <p:cNvPicPr>
+            <a:picLocks noChangeAspect="1"/>
+          </p:cNvPicPr>
+          <p:nvPr/>
+        </p:nvPicPr>
+        <p:blipFill>
+          <a:blip r:embed="rId3">
+            <a:extLst>
+              <a:ext uri="{28A0092B-C50C-407E-A947-70E740481C1C}">
+                <a14:useLocalDpi xmlns:a14="http://schemas.microsoft.com/office/drawing/2010/main" val="0"/>
+              </a:ext>
+            </a:extLst>
+          </a:blip>
+          <a:stretch>
+            <a:fillRect/>
+          </a:stretch>
+        </p:blipFill>
+        <p:spPr>
+          <a:xfrm>
+            <a:off x="1640222" y="1089622"/>
+            <a:ext cx="3219450" cy="5410200"/>
+          </a:xfrm>
+          <a:prstGeom prst="rect">
+            <a:avLst/>
+          </a:prstGeom>
+          <a:ln>
+            <a:solidFill>
+              <a:schemeClr val="tx1"/>
+            </a:solidFill>
+          </a:ln>
+        </p:spPr>
+      </p:pic>
+      <p:sp>
+        <p:nvSpPr>
+          <p:cNvPr id="4" name="右矢印 3"/>
+          <p:cNvSpPr/>
+          <p:nvPr/>
+        </p:nvSpPr>
+        <p:spPr>
+          <a:xfrm>
+            <a:off x="5081801" y="3212831"/>
+            <a:ext cx="641268" cy="1163781"/>
+          </a:xfrm>
+          <a:prstGeom prst="rightArrow">
+            <a:avLst/>
+          </a:prstGeom>
+        </p:spPr>
+        <p:style>
+          <a:lnRef idx="2">
+            <a:schemeClr val="accent1">
+              <a:shade val="50000"/>
+            </a:schemeClr>
+          </a:lnRef>
+          <a:fillRef idx="1">
+            <a:schemeClr val="accent1"/>
+          </a:fillRef>
+          <a:effectRef idx="0">
+            <a:schemeClr val="accent1"/>
+          </a:effectRef>
+          <a:fontRef idx="minor">
+            <a:schemeClr val="lt1"/>
+          </a:fontRef>
+        </p:style>
+        <p:txBody>
+          <a:bodyPr rtlCol="0" anchor="ctr"/>
+          <a:lstStyle/>
+          <a:p>
+            <a:pPr algn="ctr"/>
+            <a:endParaRPr kumimoji="1" lang="ja-JP" altLang="en-US"/>
+          </a:p>
+        </p:txBody>
+      </p:sp>
+      <p:sp>
+        <p:nvSpPr>
+          <p:cNvPr id="5" name="角丸四角形 4"/>
+          <p:cNvSpPr/>
+          <p:nvPr/>
+        </p:nvSpPr>
+        <p:spPr>
+          <a:xfrm>
+            <a:off x="2377110" y="285008"/>
+            <a:ext cx="1745673" cy="617517"/>
+          </a:xfrm>
+          <a:prstGeom prst="roundRect">
+            <a:avLst/>
+          </a:prstGeom>
+        </p:spPr>
+        <p:style>
+          <a:lnRef idx="2">
+            <a:schemeClr val="dk1"/>
+          </a:lnRef>
+          <a:fillRef idx="1">
+            <a:schemeClr val="lt1"/>
+          </a:fillRef>
+          <a:effectRef idx="0">
+            <a:schemeClr val="dk1"/>
+          </a:effectRef>
+          <a:fontRef idx="minor">
+            <a:schemeClr val="dk1"/>
+          </a:fontRef>
+        </p:style>
+        <p:txBody>
+          <a:bodyPr rtlCol="0" anchor="ctr"/>
+          <a:lstStyle/>
+          <a:p>
+            <a:pPr algn="ctr"/>
+            <a:r>
+              <a:rPr kumimoji="1" lang="en-US" altLang="ja-JP" sz="2400">
+                <a:latin typeface="HGP創英角ｺﾞｼｯｸUB" panose="020B0900000000000000" pitchFamily="50" charset="-128"/>
+                <a:ea typeface="HGP創英角ｺﾞｼｯｸUB" panose="020B0900000000000000" pitchFamily="50" charset="-128"/>
+              </a:rPr>
+              <a:t>Before</a:t>
+            </a:r>
+            <a:endParaRPr kumimoji="1" lang="ja-JP" altLang="en-US" sz="2400">
+              <a:latin typeface="HGP創英角ｺﾞｼｯｸUB" panose="020B0900000000000000" pitchFamily="50" charset="-128"/>
+              <a:ea typeface="HGP創英角ｺﾞｼｯｸUB" panose="020B0900000000000000" pitchFamily="50" charset="-128"/>
+            </a:endParaRPr>
+          </a:p>
+        </p:txBody>
+      </p:sp>
+      <p:sp>
+        <p:nvSpPr>
+          <p:cNvPr id="6" name="角丸四角形 5"/>
+          <p:cNvSpPr/>
+          <p:nvPr/>
+        </p:nvSpPr>
+        <p:spPr>
+          <a:xfrm>
+            <a:off x="6701137" y="285008"/>
+            <a:ext cx="1745673" cy="617517"/>
+          </a:xfrm>
+          <a:prstGeom prst="roundRect">
+            <a:avLst/>
+          </a:prstGeom>
+        </p:spPr>
+        <p:style>
+          <a:lnRef idx="2">
+            <a:schemeClr val="dk1"/>
+          </a:lnRef>
+          <a:fillRef idx="1">
+            <a:schemeClr val="lt1"/>
+          </a:fillRef>
+          <a:effectRef idx="0">
+            <a:schemeClr val="dk1"/>
+          </a:effectRef>
+          <a:fontRef idx="minor">
+            <a:schemeClr val="dk1"/>
+          </a:fontRef>
+        </p:style>
+        <p:txBody>
+          <a:bodyPr rtlCol="0" anchor="ctr"/>
+          <a:lstStyle/>
+          <a:p>
+            <a:pPr algn="ctr"/>
+            <a:r>
+              <a:rPr kumimoji="1" lang="en-US" altLang="ja-JP" sz="2400">
+                <a:latin typeface="HGP創英角ｺﾞｼｯｸUB" panose="020B0900000000000000" pitchFamily="50" charset="-128"/>
+                <a:ea typeface="HGP創英角ｺﾞｼｯｸUB" panose="020B0900000000000000" pitchFamily="50" charset="-128"/>
+              </a:rPr>
+              <a:t>After</a:t>
+            </a:r>
+            <a:endParaRPr kumimoji="1" lang="ja-JP" altLang="en-US" sz="2400">
+              <a:latin typeface="HGP創英角ｺﾞｼｯｸUB" panose="020B0900000000000000" pitchFamily="50" charset="-128"/>
+              <a:ea typeface="HGP創英角ｺﾞｼｯｸUB" panose="020B0900000000000000" pitchFamily="50" charset="-128"/>
+            </a:endParaRPr>
+          </a:p>
+        </p:txBody>
+      </p:sp>
+    </p:spTree>
+    <p:extLst>
+      <p:ext uri="{BB962C8B-B14F-4D97-AF65-F5344CB8AC3E}">
+        <p14:creationId xmlns:p14="http://schemas.microsoft.com/office/powerpoint/2010/main" val="3538274564"/>
       </p:ext>
     </p:extLst>
   </p:cSld>

</xml_diff>

<commit_message>
update ppt for blog
</commit_message>
<xml_diff>
--- a/documents_for_blog/blog.pptx
+++ b/documents_for_blog/blog.pptx
@@ -14,6 +14,7 @@
     <p:sldId id="262" r:id="rId8"/>
     <p:sldId id="263" r:id="rId9"/>
     <p:sldId id="264" r:id="rId10"/>
+    <p:sldId id="265" r:id="rId11"/>
   </p:sldIdLst>
   <p:sldSz cx="12192000" cy="6858000"/>
   <p:notesSz cx="6858000" cy="9144000"/>
@@ -3447,6 +3448,343 @@
 </p:sld>
 </file>
 
+<file path=ppt/slides/slide10.xml><?xml version="1.0" encoding="utf-8"?>
+<p:sld xmlns:a="http://schemas.openxmlformats.org/drawingml/2006/main" xmlns:r="http://schemas.openxmlformats.org/officeDocument/2006/relationships" xmlns:p="http://schemas.openxmlformats.org/presentationml/2006/main">
+  <p:cSld>
+    <p:spTree>
+      <p:nvGrpSpPr>
+        <p:cNvPr id="1" name=""/>
+        <p:cNvGrpSpPr/>
+        <p:nvPr/>
+      </p:nvGrpSpPr>
+      <p:grpSpPr>
+        <a:xfrm>
+          <a:off x="0" y="0"/>
+          <a:ext cx="0" cy="0"/>
+          <a:chOff x="0" y="0"/>
+          <a:chExt cx="0" cy="0"/>
+        </a:xfrm>
+      </p:grpSpPr>
+      <p:pic>
+        <p:nvPicPr>
+          <p:cNvPr id="2" name="図 1"/>
+          <p:cNvPicPr>
+            <a:picLocks noChangeAspect="1"/>
+          </p:cNvPicPr>
+          <p:nvPr/>
+        </p:nvPicPr>
+        <p:blipFill>
+          <a:blip r:embed="rId2">
+            <a:extLst>
+              <a:ext uri="{28A0092B-C50C-407E-A947-70E740481C1C}">
+                <a14:useLocalDpi xmlns:a14="http://schemas.microsoft.com/office/drawing/2010/main" val="0"/>
+              </a:ext>
+            </a:extLst>
+          </a:blip>
+          <a:stretch>
+            <a:fillRect/>
+          </a:stretch>
+        </p:blipFill>
+        <p:spPr>
+          <a:xfrm>
+            <a:off x="2218759" y="703638"/>
+            <a:ext cx="3228975" cy="5419725"/>
+          </a:xfrm>
+          <a:prstGeom prst="rect">
+            <a:avLst/>
+          </a:prstGeom>
+          <a:ln w="12700">
+            <a:solidFill>
+              <a:schemeClr val="tx1"/>
+            </a:solidFill>
+          </a:ln>
+        </p:spPr>
+      </p:pic>
+      <p:cxnSp>
+        <p:nvCxnSpPr>
+          <p:cNvPr id="8" name="直線コネクタ 7"/>
+          <p:cNvCxnSpPr/>
+          <p:nvPr/>
+        </p:nvCxnSpPr>
+        <p:spPr>
+          <a:xfrm>
+            <a:off x="2743835" y="703633"/>
+            <a:ext cx="0" cy="5419725"/>
+          </a:xfrm>
+          <a:prstGeom prst="line">
+            <a:avLst/>
+          </a:prstGeom>
+          <a:ln w="57150">
+            <a:solidFill>
+              <a:schemeClr val="accent1"/>
+            </a:solidFill>
+          </a:ln>
+        </p:spPr>
+        <p:style>
+          <a:lnRef idx="1">
+            <a:schemeClr val="accent1"/>
+          </a:lnRef>
+          <a:fillRef idx="0">
+            <a:schemeClr val="accent1"/>
+          </a:fillRef>
+          <a:effectRef idx="0">
+            <a:schemeClr val="accent1"/>
+          </a:effectRef>
+          <a:fontRef idx="minor">
+            <a:schemeClr val="tx1"/>
+          </a:fontRef>
+        </p:style>
+      </p:cxnSp>
+      <p:cxnSp>
+        <p:nvCxnSpPr>
+          <p:cNvPr id="9" name="直線コネクタ 8"/>
+          <p:cNvCxnSpPr/>
+          <p:nvPr/>
+        </p:nvCxnSpPr>
+        <p:spPr>
+          <a:xfrm>
+            <a:off x="3294380" y="703636"/>
+            <a:ext cx="0" cy="5419725"/>
+          </a:xfrm>
+          <a:prstGeom prst="line">
+            <a:avLst/>
+          </a:prstGeom>
+          <a:ln w="57150">
+            <a:solidFill>
+              <a:schemeClr val="accent1"/>
+            </a:solidFill>
+          </a:ln>
+        </p:spPr>
+        <p:style>
+          <a:lnRef idx="1">
+            <a:schemeClr val="accent1"/>
+          </a:lnRef>
+          <a:fillRef idx="0">
+            <a:schemeClr val="accent1"/>
+          </a:fillRef>
+          <a:effectRef idx="0">
+            <a:schemeClr val="accent1"/>
+          </a:effectRef>
+          <a:fontRef idx="minor">
+            <a:schemeClr val="tx1"/>
+          </a:fontRef>
+        </p:style>
+      </p:cxnSp>
+      <p:cxnSp>
+        <p:nvCxnSpPr>
+          <p:cNvPr id="10" name="直線コネクタ 9"/>
+          <p:cNvCxnSpPr/>
+          <p:nvPr/>
+        </p:nvCxnSpPr>
+        <p:spPr>
+          <a:xfrm>
+            <a:off x="3835400" y="703635"/>
+            <a:ext cx="0" cy="5419725"/>
+          </a:xfrm>
+          <a:prstGeom prst="line">
+            <a:avLst/>
+          </a:prstGeom>
+          <a:ln w="57150">
+            <a:solidFill>
+              <a:schemeClr val="accent1"/>
+            </a:solidFill>
+          </a:ln>
+        </p:spPr>
+        <p:style>
+          <a:lnRef idx="1">
+            <a:schemeClr val="accent1"/>
+          </a:lnRef>
+          <a:fillRef idx="0">
+            <a:schemeClr val="accent1"/>
+          </a:fillRef>
+          <a:effectRef idx="0">
+            <a:schemeClr val="accent1"/>
+          </a:effectRef>
+          <a:fontRef idx="minor">
+            <a:schemeClr val="tx1"/>
+          </a:fontRef>
+        </p:style>
+      </p:cxnSp>
+      <p:cxnSp>
+        <p:nvCxnSpPr>
+          <p:cNvPr id="11" name="直線コネクタ 10"/>
+          <p:cNvCxnSpPr/>
+          <p:nvPr/>
+        </p:nvCxnSpPr>
+        <p:spPr>
+          <a:xfrm>
+            <a:off x="4376420" y="703634"/>
+            <a:ext cx="0" cy="5419725"/>
+          </a:xfrm>
+          <a:prstGeom prst="line">
+            <a:avLst/>
+          </a:prstGeom>
+          <a:ln w="57150">
+            <a:solidFill>
+              <a:schemeClr val="accent1"/>
+            </a:solidFill>
+          </a:ln>
+        </p:spPr>
+        <p:style>
+          <a:lnRef idx="1">
+            <a:schemeClr val="accent1"/>
+          </a:lnRef>
+          <a:fillRef idx="0">
+            <a:schemeClr val="accent1"/>
+          </a:fillRef>
+          <a:effectRef idx="0">
+            <a:schemeClr val="accent1"/>
+          </a:effectRef>
+          <a:fontRef idx="minor">
+            <a:schemeClr val="tx1"/>
+          </a:fontRef>
+        </p:style>
+      </p:cxnSp>
+      <p:cxnSp>
+        <p:nvCxnSpPr>
+          <p:cNvPr id="12" name="直線コネクタ 11"/>
+          <p:cNvCxnSpPr/>
+          <p:nvPr/>
+        </p:nvCxnSpPr>
+        <p:spPr>
+          <a:xfrm>
+            <a:off x="4917440" y="703633"/>
+            <a:ext cx="0" cy="5419725"/>
+          </a:xfrm>
+          <a:prstGeom prst="line">
+            <a:avLst/>
+          </a:prstGeom>
+          <a:ln w="57150">
+            <a:solidFill>
+              <a:schemeClr val="accent1"/>
+            </a:solidFill>
+          </a:ln>
+        </p:spPr>
+        <p:style>
+          <a:lnRef idx="1">
+            <a:schemeClr val="accent1"/>
+          </a:lnRef>
+          <a:fillRef idx="0">
+            <a:schemeClr val="accent1"/>
+          </a:fillRef>
+          <a:effectRef idx="0">
+            <a:schemeClr val="accent1"/>
+          </a:effectRef>
+          <a:fontRef idx="minor">
+            <a:schemeClr val="tx1"/>
+          </a:fontRef>
+        </p:style>
+      </p:cxnSp>
+      <p:sp>
+        <p:nvSpPr>
+          <p:cNvPr id="13" name="角丸四角形 12"/>
+          <p:cNvSpPr/>
+          <p:nvPr/>
+        </p:nvSpPr>
+        <p:spPr>
+          <a:xfrm>
+            <a:off x="2835026" y="72390"/>
+            <a:ext cx="1996440" cy="548640"/>
+          </a:xfrm>
+          <a:prstGeom prst="roundRect">
+            <a:avLst/>
+          </a:prstGeom>
+        </p:spPr>
+        <p:style>
+          <a:lnRef idx="2">
+            <a:schemeClr val="dk1"/>
+          </a:lnRef>
+          <a:fillRef idx="1">
+            <a:schemeClr val="lt1"/>
+          </a:fillRef>
+          <a:effectRef idx="0">
+            <a:schemeClr val="dk1"/>
+          </a:effectRef>
+          <a:fontRef idx="minor">
+            <a:schemeClr val="dk1"/>
+          </a:fontRef>
+        </p:style>
+        <p:txBody>
+          <a:bodyPr rtlCol="0" anchor="ctr"/>
+          <a:lstStyle/>
+          <a:p>
+            <a:pPr algn="ctr"/>
+            <a:r>
+              <a:rPr kumimoji="1" lang="ja-JP" altLang="en-US">
+                <a:latin typeface="HGP創英角ｺﾞｼｯｸUB" panose="020B0900000000000000" pitchFamily="50" charset="-128"/>
+                <a:ea typeface="HGP創英角ｺﾞｼｯｸUB" panose="020B0900000000000000" pitchFamily="50" charset="-128"/>
+              </a:rPr>
+              <a:t>色の変化が</a:t>
+            </a:r>
+            <a:endParaRPr kumimoji="1" lang="en-US" altLang="ja-JP">
+              <a:latin typeface="HGP創英角ｺﾞｼｯｸUB" panose="020B0900000000000000" pitchFamily="50" charset="-128"/>
+              <a:ea typeface="HGP創英角ｺﾞｼｯｸUB" panose="020B0900000000000000" pitchFamily="50" charset="-128"/>
+            </a:endParaRPr>
+          </a:p>
+          <a:p>
+            <a:pPr algn="ctr"/>
+            <a:r>
+              <a:rPr kumimoji="1" lang="ja-JP" altLang="en-US">
+                <a:latin typeface="HGP創英角ｺﾞｼｯｸUB" panose="020B0900000000000000" pitchFamily="50" charset="-128"/>
+                <a:ea typeface="HGP創英角ｺﾞｼｯｸUB" panose="020B0900000000000000" pitchFamily="50" charset="-128"/>
+              </a:rPr>
+              <a:t>帯状になっている</a:t>
+            </a:r>
+            <a:endParaRPr kumimoji="1" lang="ja-JP" altLang="en-US">
+              <a:latin typeface="HGP創英角ｺﾞｼｯｸUB" panose="020B0900000000000000" pitchFamily="50" charset="-128"/>
+              <a:ea typeface="HGP創英角ｺﾞｼｯｸUB" panose="020B0900000000000000" pitchFamily="50" charset="-128"/>
+            </a:endParaRPr>
+          </a:p>
+        </p:txBody>
+      </p:sp>
+      <p:pic>
+        <p:nvPicPr>
+          <p:cNvPr id="14" name="図 13"/>
+          <p:cNvPicPr>
+            <a:picLocks noChangeAspect="1"/>
+          </p:cNvPicPr>
+          <p:nvPr/>
+        </p:nvPicPr>
+        <p:blipFill>
+          <a:blip r:embed="rId3">
+            <a:extLst>
+              <a:ext uri="{28A0092B-C50C-407E-A947-70E740481C1C}">
+                <a14:useLocalDpi xmlns:a14="http://schemas.microsoft.com/office/drawing/2010/main" val="0"/>
+              </a:ext>
+            </a:extLst>
+          </a:blip>
+          <a:stretch>
+            <a:fillRect/>
+          </a:stretch>
+        </p:blipFill>
+        <p:spPr>
+          <a:xfrm>
+            <a:off x="6523355" y="703633"/>
+            <a:ext cx="3228975" cy="5419725"/>
+          </a:xfrm>
+          <a:prstGeom prst="rect">
+            <a:avLst/>
+          </a:prstGeom>
+          <a:ln w="12700">
+            <a:solidFill>
+              <a:schemeClr val="tx1"/>
+            </a:solidFill>
+          </a:ln>
+        </p:spPr>
+      </p:pic>
+    </p:spTree>
+    <p:extLst>
+      <p:ext uri="{BB962C8B-B14F-4D97-AF65-F5344CB8AC3E}">
+        <p14:creationId xmlns:p14="http://schemas.microsoft.com/office/powerpoint/2010/main" val="3478290963"/>
+      </p:ext>
+    </p:extLst>
+  </p:cSld>
+  <p:clrMapOvr>
+    <a:masterClrMapping/>
+  </p:clrMapOvr>
+</p:sld>
+</file>
+
 <file path=ppt/slides/slide2.xml><?xml version="1.0" encoding="utf-8"?>
 <p:sld xmlns:a="http://schemas.openxmlformats.org/drawingml/2006/main" xmlns:r="http://schemas.openxmlformats.org/officeDocument/2006/relationships" xmlns:p="http://schemas.openxmlformats.org/presentationml/2006/main">
   <p:cSld>
@@ -16085,6 +16423,271 @@
           </a:p>
         </p:txBody>
       </p:sp>
+      <p:sp>
+        <p:nvSpPr>
+          <p:cNvPr id="2" name="正方形/長方形 1"/>
+          <p:cNvSpPr/>
+          <p:nvPr/>
+        </p:nvSpPr>
+        <p:spPr>
+          <a:xfrm>
+            <a:off x="4032509" y="1545431"/>
+            <a:ext cx="1006213" cy="869155"/>
+          </a:xfrm>
+          <a:prstGeom prst="rect">
+            <a:avLst/>
+          </a:prstGeom>
+          <a:noFill/>
+          <a:ln w="38100">
+            <a:solidFill>
+              <a:srgbClr val="00B0F0"/>
+            </a:solidFill>
+            <a:prstDash val="sysDot"/>
+          </a:ln>
+        </p:spPr>
+        <p:style>
+          <a:lnRef idx="2">
+            <a:schemeClr val="dk1"/>
+          </a:lnRef>
+          <a:fillRef idx="1">
+            <a:schemeClr val="lt1"/>
+          </a:fillRef>
+          <a:effectRef idx="0">
+            <a:schemeClr val="dk1"/>
+          </a:effectRef>
+          <a:fontRef idx="minor">
+            <a:schemeClr val="dk1"/>
+          </a:fontRef>
+        </p:style>
+        <p:txBody>
+          <a:bodyPr rot="0" spcFirstLastPara="0" vertOverflow="overflow" horzOverflow="overflow" vert="horz" wrap="square" lIns="91440" tIns="45720" rIns="91440" bIns="45720" numCol="1" spcCol="0" rtlCol="0" fromWordArt="0" anchor="ctr" anchorCtr="0" forceAA="0" compatLnSpc="1">
+            <a:prstTxWarp prst="textNoShape">
+              <a:avLst/>
+            </a:prstTxWarp>
+            <a:noAutofit/>
+          </a:bodyPr>
+          <a:lstStyle/>
+          <a:p>
+            <a:pPr algn="ctr"/>
+            <a:endParaRPr kumimoji="1" lang="ja-JP" altLang="en-US">
+              <a:latin typeface="HGP創英角ｺﾞｼｯｸUB" panose="020B0900000000000000" pitchFamily="50" charset="-128"/>
+              <a:ea typeface="HGP創英角ｺﾞｼｯｸUB" panose="020B0900000000000000" pitchFamily="50" charset="-128"/>
+            </a:endParaRPr>
+          </a:p>
+        </p:txBody>
+      </p:sp>
+      <p:sp>
+        <p:nvSpPr>
+          <p:cNvPr id="35" name="正方形/長方形 34"/>
+          <p:cNvSpPr/>
+          <p:nvPr/>
+        </p:nvSpPr>
+        <p:spPr>
+          <a:xfrm>
+            <a:off x="4032509" y="5073769"/>
+            <a:ext cx="1006213" cy="869155"/>
+          </a:xfrm>
+          <a:prstGeom prst="rect">
+            <a:avLst/>
+          </a:prstGeom>
+          <a:noFill/>
+          <a:ln w="38100">
+            <a:solidFill>
+              <a:srgbClr val="00B0F0"/>
+            </a:solidFill>
+            <a:prstDash val="sysDot"/>
+          </a:ln>
+        </p:spPr>
+        <p:style>
+          <a:lnRef idx="2">
+            <a:schemeClr val="dk1"/>
+          </a:lnRef>
+          <a:fillRef idx="1">
+            <a:schemeClr val="lt1"/>
+          </a:fillRef>
+          <a:effectRef idx="0">
+            <a:schemeClr val="dk1"/>
+          </a:effectRef>
+          <a:fontRef idx="minor">
+            <a:schemeClr val="dk1"/>
+          </a:fontRef>
+        </p:style>
+        <p:txBody>
+          <a:bodyPr rot="0" spcFirstLastPara="0" vertOverflow="overflow" horzOverflow="overflow" vert="horz" wrap="square" lIns="91440" tIns="45720" rIns="91440" bIns="45720" numCol="1" spcCol="0" rtlCol="0" fromWordArt="0" anchor="ctr" anchorCtr="0" forceAA="0" compatLnSpc="1">
+            <a:prstTxWarp prst="textNoShape">
+              <a:avLst/>
+            </a:prstTxWarp>
+            <a:noAutofit/>
+          </a:bodyPr>
+          <a:lstStyle/>
+          <a:p>
+            <a:pPr algn="ctr"/>
+            <a:endParaRPr kumimoji="1" lang="ja-JP" altLang="en-US">
+              <a:latin typeface="HGP創英角ｺﾞｼｯｸUB" panose="020B0900000000000000" pitchFamily="50" charset="-128"/>
+              <a:ea typeface="HGP創英角ｺﾞｼｯｸUB" panose="020B0900000000000000" pitchFamily="50" charset="-128"/>
+            </a:endParaRPr>
+          </a:p>
+        </p:txBody>
+      </p:sp>
+      <p:sp>
+        <p:nvSpPr>
+          <p:cNvPr id="36" name="正方形/長方形 35"/>
+          <p:cNvSpPr/>
+          <p:nvPr/>
+        </p:nvSpPr>
+        <p:spPr>
+          <a:xfrm>
+            <a:off x="6955721" y="5096441"/>
+            <a:ext cx="1006213" cy="869155"/>
+          </a:xfrm>
+          <a:prstGeom prst="rect">
+            <a:avLst/>
+          </a:prstGeom>
+          <a:noFill/>
+          <a:ln w="38100">
+            <a:solidFill>
+              <a:srgbClr val="00B0F0"/>
+            </a:solidFill>
+            <a:prstDash val="sysDot"/>
+          </a:ln>
+        </p:spPr>
+        <p:style>
+          <a:lnRef idx="2">
+            <a:schemeClr val="dk1"/>
+          </a:lnRef>
+          <a:fillRef idx="1">
+            <a:schemeClr val="lt1"/>
+          </a:fillRef>
+          <a:effectRef idx="0">
+            <a:schemeClr val="dk1"/>
+          </a:effectRef>
+          <a:fontRef idx="minor">
+            <a:schemeClr val="dk1"/>
+          </a:fontRef>
+        </p:style>
+        <p:txBody>
+          <a:bodyPr rot="0" spcFirstLastPara="0" vertOverflow="overflow" horzOverflow="overflow" vert="horz" wrap="square" lIns="91440" tIns="45720" rIns="91440" bIns="45720" numCol="1" spcCol="0" rtlCol="0" fromWordArt="0" anchor="ctr" anchorCtr="0" forceAA="0" compatLnSpc="1">
+            <a:prstTxWarp prst="textNoShape">
+              <a:avLst/>
+            </a:prstTxWarp>
+            <a:noAutofit/>
+          </a:bodyPr>
+          <a:lstStyle/>
+          <a:p>
+            <a:pPr algn="ctr"/>
+            <a:endParaRPr kumimoji="1" lang="ja-JP" altLang="en-US">
+              <a:latin typeface="HGP創英角ｺﾞｼｯｸUB" panose="020B0900000000000000" pitchFamily="50" charset="-128"/>
+              <a:ea typeface="HGP創英角ｺﾞｼｯｸUB" panose="020B0900000000000000" pitchFamily="50" charset="-128"/>
+            </a:endParaRPr>
+          </a:p>
+        </p:txBody>
+      </p:sp>
+      <p:sp>
+        <p:nvSpPr>
+          <p:cNvPr id="37" name="正方形/長方形 36"/>
+          <p:cNvSpPr/>
+          <p:nvPr/>
+        </p:nvSpPr>
+        <p:spPr>
+          <a:xfrm>
+            <a:off x="9908458" y="5073769"/>
+            <a:ext cx="1006213" cy="869155"/>
+          </a:xfrm>
+          <a:prstGeom prst="rect">
+            <a:avLst/>
+          </a:prstGeom>
+          <a:noFill/>
+          <a:ln w="38100">
+            <a:solidFill>
+              <a:srgbClr val="00B0F0"/>
+            </a:solidFill>
+            <a:prstDash val="sysDot"/>
+          </a:ln>
+        </p:spPr>
+        <p:style>
+          <a:lnRef idx="2">
+            <a:schemeClr val="dk1"/>
+          </a:lnRef>
+          <a:fillRef idx="1">
+            <a:schemeClr val="lt1"/>
+          </a:fillRef>
+          <a:effectRef idx="0">
+            <a:schemeClr val="dk1"/>
+          </a:effectRef>
+          <a:fontRef idx="minor">
+            <a:schemeClr val="dk1"/>
+          </a:fontRef>
+        </p:style>
+        <p:txBody>
+          <a:bodyPr rot="0" spcFirstLastPara="0" vertOverflow="overflow" horzOverflow="overflow" vert="horz" wrap="square" lIns="91440" tIns="45720" rIns="91440" bIns="45720" numCol="1" spcCol="0" rtlCol="0" fromWordArt="0" anchor="ctr" anchorCtr="0" forceAA="0" compatLnSpc="1">
+            <a:prstTxWarp prst="textNoShape">
+              <a:avLst/>
+            </a:prstTxWarp>
+            <a:noAutofit/>
+          </a:bodyPr>
+          <a:lstStyle/>
+          <a:p>
+            <a:pPr algn="ctr"/>
+            <a:endParaRPr kumimoji="1" lang="ja-JP" altLang="en-US">
+              <a:latin typeface="HGP創英角ｺﾞｼｯｸUB" panose="020B0900000000000000" pitchFamily="50" charset="-128"/>
+              <a:ea typeface="HGP創英角ｺﾞｼｯｸUB" panose="020B0900000000000000" pitchFamily="50" charset="-128"/>
+            </a:endParaRPr>
+          </a:p>
+        </p:txBody>
+      </p:sp>
+      <p:sp>
+        <p:nvSpPr>
+          <p:cNvPr id="38" name="正方形/長方形 37"/>
+          <p:cNvSpPr/>
+          <p:nvPr/>
+        </p:nvSpPr>
+        <p:spPr>
+          <a:xfrm>
+            <a:off x="12795509" y="5051675"/>
+            <a:ext cx="1006213" cy="869155"/>
+          </a:xfrm>
+          <a:prstGeom prst="rect">
+            <a:avLst/>
+          </a:prstGeom>
+          <a:noFill/>
+          <a:ln w="38100">
+            <a:solidFill>
+              <a:srgbClr val="00B0F0"/>
+            </a:solidFill>
+            <a:prstDash val="sysDot"/>
+          </a:ln>
+        </p:spPr>
+        <p:style>
+          <a:lnRef idx="2">
+            <a:schemeClr val="dk1"/>
+          </a:lnRef>
+          <a:fillRef idx="1">
+            <a:schemeClr val="lt1"/>
+          </a:fillRef>
+          <a:effectRef idx="0">
+            <a:schemeClr val="dk1"/>
+          </a:effectRef>
+          <a:fontRef idx="minor">
+            <a:schemeClr val="dk1"/>
+          </a:fontRef>
+        </p:style>
+        <p:txBody>
+          <a:bodyPr rot="0" spcFirstLastPara="0" vertOverflow="overflow" horzOverflow="overflow" vert="horz" wrap="square" lIns="91440" tIns="45720" rIns="91440" bIns="45720" numCol="1" spcCol="0" rtlCol="0" fromWordArt="0" anchor="ctr" anchorCtr="0" forceAA="0" compatLnSpc="1">
+            <a:prstTxWarp prst="textNoShape">
+              <a:avLst/>
+            </a:prstTxWarp>
+            <a:noAutofit/>
+          </a:bodyPr>
+          <a:lstStyle/>
+          <a:p>
+            <a:pPr algn="ctr"/>
+            <a:endParaRPr kumimoji="1" lang="ja-JP" altLang="en-US">
+              <a:latin typeface="HGP創英角ｺﾞｼｯｸUB" panose="020B0900000000000000" pitchFamily="50" charset="-128"/>
+              <a:ea typeface="HGP創英角ｺﾞｼｯｸUB" panose="020B0900000000000000" pitchFamily="50" charset="-128"/>
+            </a:endParaRPr>
+          </a:p>
+        </p:txBody>
+      </p:sp>
     </p:spTree>
     <p:extLst>
       <p:ext uri="{BB962C8B-B14F-4D97-AF65-F5344CB8AC3E}">
@@ -19838,16 +20441,18 @@
         </p:spPr>
         <p:style>
           <a:lnRef idx="2">
-            <a:schemeClr val="dk1"/>
+            <a:schemeClr val="dk1">
+              <a:shade val="50000"/>
+            </a:schemeClr>
           </a:lnRef>
           <a:fillRef idx="1">
-            <a:schemeClr val="lt1"/>
+            <a:schemeClr val="dk1"/>
           </a:fillRef>
           <a:effectRef idx="0">
             <a:schemeClr val="dk1"/>
           </a:effectRef>
           <a:fontRef idx="minor">
-            <a:schemeClr val="dk1"/>
+            <a:schemeClr val="lt1"/>
           </a:fontRef>
         </p:style>
         <p:txBody>
@@ -20167,7 +20772,34 @@
       </a:bgFillStyleLst>
     </a:fmtScheme>
   </a:themeElements>
-  <a:objectDefaults/>
+  <a:objectDefaults>
+    <a:spDef>
+      <a:spPr/>
+      <a:bodyPr rtlCol="0" anchor="ctr"/>
+      <a:lstStyle>
+        <a:defPPr algn="ctr">
+          <a:defRPr kumimoji="1">
+            <a:latin typeface="HGP創英角ｺﾞｼｯｸUB" panose="020B0900000000000000" pitchFamily="50" charset="-128"/>
+            <a:ea typeface="HGP創英角ｺﾞｼｯｸUB" panose="020B0900000000000000" pitchFamily="50" charset="-128"/>
+          </a:defRPr>
+        </a:defPPr>
+      </a:lstStyle>
+      <a:style>
+        <a:lnRef idx="2">
+          <a:schemeClr val="dk1"/>
+        </a:lnRef>
+        <a:fillRef idx="1">
+          <a:schemeClr val="lt1"/>
+        </a:fillRef>
+        <a:effectRef idx="0">
+          <a:schemeClr val="dk1"/>
+        </a:effectRef>
+        <a:fontRef idx="minor">
+          <a:schemeClr val="dk1"/>
+        </a:fontRef>
+      </a:style>
+    </a:spDef>
+  </a:objectDefaults>
   <a:extraClrSchemeLst/>
   <a:extLst>
     <a:ext uri="{05A4C25C-085E-4340-85A3-A5531E510DB2}">

</xml_diff>